<commit_message>
prezentacija ( verzija 2)
</commit_message>
<xml_diff>
--- a/I spot a bot.pptx
+++ b/I spot a bot.pptx
@@ -14,6 +14,7 @@
     <p:sldId id="262" r:id="rId8"/>
     <p:sldId id="263" r:id="rId9"/>
     <p:sldId id="264" r:id="rId10"/>
+    <p:sldId id="265" r:id="rId11"/>
   </p:sldIdLst>
   <p:sldSz cx="12192000" cy="6858000"/>
   <p:notesSz cx="6858000" cy="9144000"/>
@@ -5935,6 +5936,91 @@
 </p:sld>
 </file>
 
+<file path=ppt/slides/slide10.xml><?xml version="1.0" encoding="utf-8"?>
+<p:sld xmlns:a="http://schemas.openxmlformats.org/drawingml/2006/main" xmlns:r="http://schemas.openxmlformats.org/officeDocument/2006/relationships" xmlns:p="http://schemas.openxmlformats.org/presentationml/2006/main">
+  <p:cSld>
+    <p:spTree>
+      <p:nvGrpSpPr>
+        <p:cNvPr id="1" name=""/>
+        <p:cNvGrpSpPr/>
+        <p:nvPr/>
+      </p:nvGrpSpPr>
+      <p:grpSpPr>
+        <a:xfrm>
+          <a:off x="0" y="0"/>
+          <a:ext cx="0" cy="0"/>
+          <a:chOff x="0" y="0"/>
+          <a:chExt cx="0" cy="0"/>
+        </a:xfrm>
+      </p:grpSpPr>
+      <p:sp>
+        <p:nvSpPr>
+          <p:cNvPr id="2" name="Title 1">
+            <a:extLst>
+              <a:ext uri="{FF2B5EF4-FFF2-40B4-BE49-F238E27FC236}">
+                <a16:creationId xmlns:a16="http://schemas.microsoft.com/office/drawing/2014/main" id="{534F3CC8-D134-4DDA-8344-FA69162A0B18}"/>
+              </a:ext>
+            </a:extLst>
+          </p:cNvPr>
+          <p:cNvSpPr>
+            <a:spLocks noGrp="1"/>
+          </p:cNvSpPr>
+          <p:nvPr>
+            <p:ph type="title"/>
+          </p:nvPr>
+        </p:nvSpPr>
+        <p:spPr>
+          <a:xfrm>
+            <a:off x="2598899" y="3021495"/>
+            <a:ext cx="8596668" cy="1320800"/>
+          </a:xfrm>
+        </p:spPr>
+        <p:txBody>
+          <a:bodyPr>
+            <a:normAutofit/>
+          </a:bodyPr>
+          <a:lstStyle/>
+          <a:p>
+            <a:r>
+              <a:rPr lang="en-US" sz="4400" dirty="0" err="1"/>
+              <a:t>Hvala</a:t>
+            </a:r>
+            <a:r>
+              <a:rPr lang="en-US" sz="4400" dirty="0"/>
+              <a:t> </a:t>
+            </a:r>
+            <a:r>
+              <a:rPr lang="en-US" sz="4400" dirty="0" err="1"/>
+              <a:t>na</a:t>
+            </a:r>
+            <a:r>
+              <a:rPr lang="en-US" sz="4400" dirty="0"/>
+              <a:t> </a:t>
+            </a:r>
+            <a:r>
+              <a:rPr lang="en-US" sz="4400" dirty="0" err="1"/>
+              <a:t>paznji</a:t>
+            </a:r>
+            <a:r>
+              <a:rPr lang="en-US" sz="4400" dirty="0"/>
+              <a:t>!</a:t>
+            </a:r>
+          </a:p>
+        </p:txBody>
+      </p:sp>
+    </p:spTree>
+    <p:extLst>
+      <p:ext uri="{BB962C8B-B14F-4D97-AF65-F5344CB8AC3E}">
+        <p14:creationId xmlns:p14="http://schemas.microsoft.com/office/powerpoint/2010/main" val="493171242"/>
+      </p:ext>
+    </p:extLst>
+  </p:cSld>
+  <p:clrMapOvr>
+    <a:masterClrMapping/>
+  </p:clrMapOvr>
+</p:sld>
+</file>
+
 <file path=ppt/slides/slide2.xml><?xml version="1.0" encoding="utf-8"?>
 <p:sld xmlns:a="http://schemas.openxmlformats.org/drawingml/2006/main" xmlns:r="http://schemas.openxmlformats.org/officeDocument/2006/relationships" xmlns:p="http://schemas.openxmlformats.org/presentationml/2006/main">
   <p:cSld>
@@ -6979,7 +7065,12 @@
             <p:ph idx="1"/>
           </p:nvPr>
         </p:nvSpPr>
-        <p:spPr/>
+        <p:spPr>
+          <a:xfrm>
+            <a:off x="677334" y="2054838"/>
+            <a:ext cx="8596668" cy="3880773"/>
+          </a:xfrm>
+        </p:spPr>
         <p:txBody>
           <a:bodyPr/>
           <a:lstStyle/>
@@ -7005,23 +7096,15 @@
             <a:endParaRPr lang="en-US" dirty="0"/>
           </a:p>
           <a:p>
-            <a:pPr lvl="1"/>
-            <a:endParaRPr lang="en-US" dirty="0"/>
-          </a:p>
-          <a:p>
-            <a:endParaRPr lang="en-US" dirty="0"/>
-          </a:p>
-          <a:p>
-            <a:endParaRPr lang="en-US" dirty="0"/>
-          </a:p>
-          <a:p>
-            <a:r>
-              <a:rPr lang="sr-Latn-RS" dirty="0"/>
-              <a:t> </a:t>
-            </a:r>
             <a:r>
               <a:rPr lang="en-US" dirty="0"/>
-              <a:t>Test loss: ~0.077, test accuracy: ~0.97 </a:t>
+              <a:t>Test loss: ~0.077</a:t>
+            </a:r>
+          </a:p>
+          <a:p>
+            <a:r>
+              <a:rPr lang="en-US" dirty="0"/>
+              <a:t>Test accuracy: ~0.97 </a:t>
             </a:r>
           </a:p>
         </p:txBody>
@@ -7048,8 +7131,68 @@
         </p:blipFill>
         <p:spPr>
           <a:xfrm>
-            <a:off x="3344982" y="1578708"/>
+            <a:off x="3499726" y="1855199"/>
             <a:ext cx="5929020" cy="2064825"/>
+          </a:xfrm>
+          <a:prstGeom prst="rect">
+            <a:avLst/>
+          </a:prstGeom>
+        </p:spPr>
+      </p:pic>
+      <p:pic>
+        <p:nvPicPr>
+          <p:cNvPr id="5" name="Picture 4">
+            <a:extLst>
+              <a:ext uri="{FF2B5EF4-FFF2-40B4-BE49-F238E27FC236}">
+                <a16:creationId xmlns:a16="http://schemas.microsoft.com/office/drawing/2014/main" id="{C4620206-1D6B-4985-8CFC-1E021B1E16BC}"/>
+              </a:ext>
+            </a:extLst>
+          </p:cNvPr>
+          <p:cNvPicPr>
+            <a:picLocks noChangeAspect="1"/>
+          </p:cNvPicPr>
+          <p:nvPr/>
+        </p:nvPicPr>
+        <p:blipFill>
+          <a:blip r:embed="rId3"/>
+          <a:stretch>
+            <a:fillRect/>
+          </a:stretch>
+        </p:blipFill>
+        <p:spPr>
+          <a:xfrm>
+            <a:off x="4502884" y="4097459"/>
+            <a:ext cx="3965867" cy="2668327"/>
+          </a:xfrm>
+          <a:prstGeom prst="rect">
+            <a:avLst/>
+          </a:prstGeom>
+        </p:spPr>
+      </p:pic>
+      <p:pic>
+        <p:nvPicPr>
+          <p:cNvPr id="6" name="Picture 5">
+            <a:extLst>
+              <a:ext uri="{FF2B5EF4-FFF2-40B4-BE49-F238E27FC236}">
+                <a16:creationId xmlns:a16="http://schemas.microsoft.com/office/drawing/2014/main" id="{D1297466-BA18-4418-A237-B39CD1F56694}"/>
+              </a:ext>
+            </a:extLst>
+          </p:cNvPr>
+          <p:cNvPicPr>
+            <a:picLocks noChangeAspect="1"/>
+          </p:cNvPicPr>
+          <p:nvPr/>
+        </p:nvPicPr>
+        <p:blipFill>
+          <a:blip r:embed="rId4"/>
+          <a:stretch>
+            <a:fillRect/>
+          </a:stretch>
+        </p:blipFill>
+        <p:spPr>
+          <a:xfrm>
+            <a:off x="598914" y="4097459"/>
+            <a:ext cx="3903970" cy="2578863"/>
           </a:xfrm>
           <a:prstGeom prst="rect">
             <a:avLst/>

</xml_diff>